<commit_message>
moved all tasks to done
</commit_message>
<xml_diff>
--- a/sprint_task_board.pptx
+++ b/sprint_task_board.pptx
@@ -260,7 +260,7 @@
           <a:p>
             <a:fld id="{B6341FFD-5D10-463C-B7CE-F9E5B3035469}" type="datetimeFigureOut">
               <a:rPr lang="en-US" smtClean="0"/>
-              <a:t>9/24/2020</a:t>
+              <a:t>9/28/2020</a:t>
             </a:fld>
             <a:endParaRPr lang="en-US"/>
           </a:p>
@@ -458,7 +458,7 @@
           <a:p>
             <a:fld id="{B6341FFD-5D10-463C-B7CE-F9E5B3035469}" type="datetimeFigureOut">
               <a:rPr lang="en-US" smtClean="0"/>
-              <a:t>9/24/2020</a:t>
+              <a:t>9/28/2020</a:t>
             </a:fld>
             <a:endParaRPr lang="en-US"/>
           </a:p>
@@ -666,7 +666,7 @@
           <a:p>
             <a:fld id="{B6341FFD-5D10-463C-B7CE-F9E5B3035469}" type="datetimeFigureOut">
               <a:rPr lang="en-US" smtClean="0"/>
-              <a:t>9/24/2020</a:t>
+              <a:t>9/28/2020</a:t>
             </a:fld>
             <a:endParaRPr lang="en-US"/>
           </a:p>
@@ -864,7 +864,7 @@
           <a:p>
             <a:fld id="{B6341FFD-5D10-463C-B7CE-F9E5B3035469}" type="datetimeFigureOut">
               <a:rPr lang="en-US" smtClean="0"/>
-              <a:t>9/24/2020</a:t>
+              <a:t>9/28/2020</a:t>
             </a:fld>
             <a:endParaRPr lang="en-US"/>
           </a:p>
@@ -1139,7 +1139,7 @@
           <a:p>
             <a:fld id="{B6341FFD-5D10-463C-B7CE-F9E5B3035469}" type="datetimeFigureOut">
               <a:rPr lang="en-US" smtClean="0"/>
-              <a:t>9/24/2020</a:t>
+              <a:t>9/28/2020</a:t>
             </a:fld>
             <a:endParaRPr lang="en-US"/>
           </a:p>
@@ -1404,7 +1404,7 @@
           <a:p>
             <a:fld id="{B6341FFD-5D10-463C-B7CE-F9E5B3035469}" type="datetimeFigureOut">
               <a:rPr lang="en-US" smtClean="0"/>
-              <a:t>9/24/2020</a:t>
+              <a:t>9/28/2020</a:t>
             </a:fld>
             <a:endParaRPr lang="en-US"/>
           </a:p>
@@ -1816,7 +1816,7 @@
           <a:p>
             <a:fld id="{B6341FFD-5D10-463C-B7CE-F9E5B3035469}" type="datetimeFigureOut">
               <a:rPr lang="en-US" smtClean="0"/>
-              <a:t>9/24/2020</a:t>
+              <a:t>9/28/2020</a:t>
             </a:fld>
             <a:endParaRPr lang="en-US"/>
           </a:p>
@@ -1957,7 +1957,7 @@
           <a:p>
             <a:fld id="{B6341FFD-5D10-463C-B7CE-F9E5B3035469}" type="datetimeFigureOut">
               <a:rPr lang="en-US" smtClean="0"/>
-              <a:t>9/24/2020</a:t>
+              <a:t>9/28/2020</a:t>
             </a:fld>
             <a:endParaRPr lang="en-US"/>
           </a:p>
@@ -2070,7 +2070,7 @@
           <a:p>
             <a:fld id="{B6341FFD-5D10-463C-B7CE-F9E5B3035469}" type="datetimeFigureOut">
               <a:rPr lang="en-US" smtClean="0"/>
-              <a:t>9/24/2020</a:t>
+              <a:t>9/28/2020</a:t>
             </a:fld>
             <a:endParaRPr lang="en-US"/>
           </a:p>
@@ -2381,7 +2381,7 @@
           <a:p>
             <a:fld id="{B6341FFD-5D10-463C-B7CE-F9E5B3035469}" type="datetimeFigureOut">
               <a:rPr lang="en-US" smtClean="0"/>
-              <a:t>9/24/2020</a:t>
+              <a:t>9/28/2020</a:t>
             </a:fld>
             <a:endParaRPr lang="en-US"/>
           </a:p>
@@ -2669,7 +2669,7 @@
           <a:p>
             <a:fld id="{B6341FFD-5D10-463C-B7CE-F9E5B3035469}" type="datetimeFigureOut">
               <a:rPr lang="en-US" smtClean="0"/>
-              <a:t>9/24/2020</a:t>
+              <a:t>9/28/2020</a:t>
             </a:fld>
             <a:endParaRPr lang="en-US"/>
           </a:p>
@@ -2910,7 +2910,7 @@
           <a:p>
             <a:fld id="{B6341FFD-5D10-463C-B7CE-F9E5B3035469}" type="datetimeFigureOut">
               <a:rPr lang="en-US" smtClean="0"/>
-              <a:t>9/24/2020</a:t>
+              <a:t>9/28/2020</a:t>
             </a:fld>
             <a:endParaRPr lang="en-US"/>
           </a:p>
@@ -3409,10 +3409,10 @@
       </p:sp>
       <p:sp>
         <p:nvSpPr>
-          <p:cNvPr id="21" name="Rectangle 20">
-            <a:extLst>
-              <a:ext uri="{FF2B5EF4-FFF2-40B4-BE49-F238E27FC236}">
-                <a16:creationId xmlns:a16="http://schemas.microsoft.com/office/drawing/2014/main" id="{B2FF60AC-91EF-4D69-ACB9-CC146BDC6526}"/>
+          <p:cNvPr id="23" name="Rectangle 22">
+            <a:extLst>
+              <a:ext uri="{FF2B5EF4-FFF2-40B4-BE49-F238E27FC236}">
+                <a16:creationId xmlns:a16="http://schemas.microsoft.com/office/drawing/2014/main" id="{F0CB5917-D9C5-4F78-B41A-F70D3EFFCF26}"/>
               </a:ext>
             </a:extLst>
           </p:cNvPr>
@@ -3421,61 +3421,7 @@
         </p:nvSpPr>
         <p:spPr>
           <a:xfrm>
-            <a:off x="3819913" y="3970664"/>
-            <a:ext cx="1093927" cy="499722"/>
-          </a:xfrm>
-          <a:prstGeom prst="rect">
-            <a:avLst/>
-          </a:prstGeom>
-        </p:spPr>
-        <p:style>
-          <a:lnRef idx="2">
-            <a:schemeClr val="accent1">
-              <a:shade val="50000"/>
-            </a:schemeClr>
-          </a:lnRef>
-          <a:fillRef idx="1">
-            <a:schemeClr val="accent1"/>
-          </a:fillRef>
-          <a:effectRef idx="0">
-            <a:schemeClr val="accent1"/>
-          </a:effectRef>
-          <a:fontRef idx="minor">
-            <a:schemeClr val="lt1"/>
-          </a:fontRef>
-        </p:style>
-        <p:txBody>
-          <a:bodyPr rtlCol="0" anchor="ctr"/>
-          <a:lstStyle/>
-          <a:p>
-            <a:pPr algn="ctr"/>
-            <a:r>
-              <a:rPr lang="en-US" sz="800" dirty="0">
-                <a:solidFill>
-                  <a:schemeClr val="bg1"/>
-                </a:solidFill>
-              </a:rPr>
-              <a:t>Task #1: Download Door asset for trap door</a:t>
-            </a:r>
-            <a:endParaRPr lang="en-US" dirty="0"/>
-          </a:p>
-        </p:txBody>
-      </p:sp>
-      <p:sp>
-        <p:nvSpPr>
-          <p:cNvPr id="23" name="Rectangle 22">
-            <a:extLst>
-              <a:ext uri="{FF2B5EF4-FFF2-40B4-BE49-F238E27FC236}">
-                <a16:creationId xmlns:a16="http://schemas.microsoft.com/office/drawing/2014/main" id="{F0CB5917-D9C5-4F78-B41A-F70D3EFFCF26}"/>
-              </a:ext>
-            </a:extLst>
-          </p:cNvPr>
-          <p:cNvSpPr/>
-          <p:nvPr/>
-        </p:nvSpPr>
-        <p:spPr>
-          <a:xfrm>
-            <a:off x="3820341" y="4643276"/>
+            <a:off x="10798003" y="3964575"/>
             <a:ext cx="1093927" cy="499722"/>
           </a:xfrm>
           <a:prstGeom prst="rect">
@@ -3563,7 +3509,7 @@
                   <a:schemeClr val="bg1"/>
                 </a:solidFill>
               </a:rPr>
-              <a:t>Task #3: Make Open Door Component</a:t>
+              <a:t>Task #1: Make Open Door Component</a:t>
             </a:r>
             <a:endParaRPr lang="en-US" dirty="0"/>
           </a:p>
@@ -4529,7 +4475,7 @@
         </p:nvSpPr>
         <p:spPr>
           <a:xfrm>
-            <a:off x="5086415" y="4643276"/>
+            <a:off x="9454335" y="4592271"/>
             <a:ext cx="1093927" cy="499722"/>
           </a:xfrm>
           <a:prstGeom prst="rect">
@@ -4563,7 +4509,7 @@
                   <a:schemeClr val="bg1"/>
                 </a:solidFill>
               </a:rPr>
-              <a:t>Task #4: Attach Open Door component to trap door</a:t>
+              <a:t>Task #3: Attach Open Door component to trap door</a:t>
             </a:r>
             <a:endParaRPr lang="en-US" dirty="0"/>
           </a:p>
@@ -4745,7 +4691,7 @@
         </p:nvSpPr>
         <p:spPr>
           <a:xfrm>
-            <a:off x="7956705" y="2236794"/>
+            <a:off x="9385516" y="2891823"/>
             <a:ext cx="1093927" cy="499722"/>
           </a:xfrm>
           <a:prstGeom prst="rect">
@@ -4963,7 +4909,7 @@
         </p:nvSpPr>
         <p:spPr>
           <a:xfrm>
-            <a:off x="10988298" y="4415007"/>
+            <a:off x="10824170" y="4415007"/>
             <a:ext cx="1093927" cy="499722"/>
           </a:xfrm>
           <a:prstGeom prst="rect">
@@ -5017,7 +4963,7 @@
         </p:nvSpPr>
         <p:spPr>
           <a:xfrm>
-            <a:off x="9596619" y="5127257"/>
+            <a:off x="9596619" y="5042703"/>
             <a:ext cx="1093927" cy="499722"/>
           </a:xfrm>
           <a:prstGeom prst="rect">
@@ -6067,7 +6013,7 @@
         </p:nvSpPr>
         <p:spPr>
           <a:xfrm>
-            <a:off x="3827432" y="4415007"/>
+            <a:off x="10824169" y="5042703"/>
             <a:ext cx="1093927" cy="499722"/>
           </a:xfrm>
           <a:prstGeom prst="rect">
@@ -6372,60 +6318,6 @@
                 </a:solidFill>
               </a:rPr>
               <a:t>Person doing task:  Hannah</a:t>
-            </a:r>
-            <a:endParaRPr lang="en-US" dirty="0"/>
-          </a:p>
-        </p:txBody>
-      </p:sp>
-      <p:sp>
-        <p:nvSpPr>
-          <p:cNvPr id="27" name="Rectangle 26">
-            <a:extLst>
-              <a:ext uri="{FF2B5EF4-FFF2-40B4-BE49-F238E27FC236}">
-                <a16:creationId xmlns:a16="http://schemas.microsoft.com/office/drawing/2014/main" id="{ABD8C12D-0590-401B-9810-3C70D06503BB}"/>
-              </a:ext>
-            </a:extLst>
-          </p:cNvPr>
-          <p:cNvSpPr/>
-          <p:nvPr/>
-        </p:nvSpPr>
-        <p:spPr>
-          <a:xfrm>
-            <a:off x="6819682" y="2920418"/>
-            <a:ext cx="1093927" cy="499722"/>
-          </a:xfrm>
-          <a:prstGeom prst="rect">
-            <a:avLst/>
-          </a:prstGeom>
-        </p:spPr>
-        <p:style>
-          <a:lnRef idx="2">
-            <a:schemeClr val="accent1">
-              <a:shade val="50000"/>
-            </a:schemeClr>
-          </a:lnRef>
-          <a:fillRef idx="1">
-            <a:schemeClr val="accent1"/>
-          </a:fillRef>
-          <a:effectRef idx="0">
-            <a:schemeClr val="accent1"/>
-          </a:effectRef>
-          <a:fontRef idx="minor">
-            <a:schemeClr val="lt1"/>
-          </a:fontRef>
-        </p:style>
-        <p:txBody>
-          <a:bodyPr rtlCol="0" anchor="ctr"/>
-          <a:lstStyle/>
-          <a:p>
-            <a:pPr algn="ctr"/>
-            <a:r>
-              <a:rPr lang="en-US" sz="800" dirty="0">
-                <a:solidFill>
-                  <a:schemeClr val="bg1"/>
-                </a:solidFill>
-              </a:rPr>
-              <a:t>Task #7: Insert Test Level</a:t>
             </a:r>
             <a:endParaRPr lang="en-US" dirty="0"/>
           </a:p>

</xml_diff>